<commit_message>
rgcn architecture for paper
</commit_message>
<xml_diff>
--- a/diagrams/diagrams.pptx
+++ b/diagrams/diagrams.pptx
@@ -6,6 +6,8 @@
   </p:sldMasterIdLst>
   <p:sldIdLst>
     <p:sldId id="257" r:id="rId2"/>
+    <p:sldId id="258" r:id="rId3"/>
+    <p:sldId id="259" r:id="rId4"/>
   </p:sldIdLst>
   <p:sldSz cx="12192000" cy="6858000"/>
   <p:notesSz cx="6858000" cy="9144000"/>
@@ -270,7 +272,7 @@
           <a:p>
             <a:fld id="{DA6D5642-3BC6-4258-B43A-21752B449250}" type="datetimeFigureOut">
               <a:rPr lang="en-US" smtClean="0"/>
-              <a:t>4/21/2025</a:t>
+              <a:t>4/25/2025</a:t>
             </a:fld>
             <a:endParaRPr lang="en-US"/>
           </a:p>
@@ -468,7 +470,7 @@
           <a:p>
             <a:fld id="{DA6D5642-3BC6-4258-B43A-21752B449250}" type="datetimeFigureOut">
               <a:rPr lang="en-US" smtClean="0"/>
-              <a:t>4/21/2025</a:t>
+              <a:t>4/25/2025</a:t>
             </a:fld>
             <a:endParaRPr lang="en-US"/>
           </a:p>
@@ -676,7 +678,7 @@
           <a:p>
             <a:fld id="{DA6D5642-3BC6-4258-B43A-21752B449250}" type="datetimeFigureOut">
               <a:rPr lang="en-US" smtClean="0"/>
-              <a:t>4/21/2025</a:t>
+              <a:t>4/25/2025</a:t>
             </a:fld>
             <a:endParaRPr lang="en-US"/>
           </a:p>
@@ -874,7 +876,7 @@
           <a:p>
             <a:fld id="{DA6D5642-3BC6-4258-B43A-21752B449250}" type="datetimeFigureOut">
               <a:rPr lang="en-US" smtClean="0"/>
-              <a:t>4/21/2025</a:t>
+              <a:t>4/25/2025</a:t>
             </a:fld>
             <a:endParaRPr lang="en-US"/>
           </a:p>
@@ -1149,7 +1151,7 @@
           <a:p>
             <a:fld id="{DA6D5642-3BC6-4258-B43A-21752B449250}" type="datetimeFigureOut">
               <a:rPr lang="en-US" smtClean="0"/>
-              <a:t>4/21/2025</a:t>
+              <a:t>4/25/2025</a:t>
             </a:fld>
             <a:endParaRPr lang="en-US"/>
           </a:p>
@@ -1414,7 +1416,7 @@
           <a:p>
             <a:fld id="{DA6D5642-3BC6-4258-B43A-21752B449250}" type="datetimeFigureOut">
               <a:rPr lang="en-US" smtClean="0"/>
-              <a:t>4/21/2025</a:t>
+              <a:t>4/25/2025</a:t>
             </a:fld>
             <a:endParaRPr lang="en-US"/>
           </a:p>
@@ -1826,7 +1828,7 @@
           <a:p>
             <a:fld id="{DA6D5642-3BC6-4258-B43A-21752B449250}" type="datetimeFigureOut">
               <a:rPr lang="en-US" smtClean="0"/>
-              <a:t>4/21/2025</a:t>
+              <a:t>4/25/2025</a:t>
             </a:fld>
             <a:endParaRPr lang="en-US"/>
           </a:p>
@@ -1967,7 +1969,7 @@
           <a:p>
             <a:fld id="{DA6D5642-3BC6-4258-B43A-21752B449250}" type="datetimeFigureOut">
               <a:rPr lang="en-US" smtClean="0"/>
-              <a:t>4/21/2025</a:t>
+              <a:t>4/25/2025</a:t>
             </a:fld>
             <a:endParaRPr lang="en-US"/>
           </a:p>
@@ -2080,7 +2082,7 @@
           <a:p>
             <a:fld id="{DA6D5642-3BC6-4258-B43A-21752B449250}" type="datetimeFigureOut">
               <a:rPr lang="en-US" smtClean="0"/>
-              <a:t>4/21/2025</a:t>
+              <a:t>4/25/2025</a:t>
             </a:fld>
             <a:endParaRPr lang="en-US"/>
           </a:p>
@@ -2391,7 +2393,7 @@
           <a:p>
             <a:fld id="{DA6D5642-3BC6-4258-B43A-21752B449250}" type="datetimeFigureOut">
               <a:rPr lang="en-US" smtClean="0"/>
-              <a:t>4/21/2025</a:t>
+              <a:t>4/25/2025</a:t>
             </a:fld>
             <a:endParaRPr lang="en-US"/>
           </a:p>
@@ -2679,7 +2681,7 @@
           <a:p>
             <a:fld id="{DA6D5642-3BC6-4258-B43A-21752B449250}" type="datetimeFigureOut">
               <a:rPr lang="en-US" smtClean="0"/>
-              <a:t>4/21/2025</a:t>
+              <a:t>4/25/2025</a:t>
             </a:fld>
             <a:endParaRPr lang="en-US"/>
           </a:p>
@@ -2920,7 +2922,7 @@
           <a:p>
             <a:fld id="{DA6D5642-3BC6-4258-B43A-21752B449250}" type="datetimeFigureOut">
               <a:rPr lang="en-US" smtClean="0"/>
-              <a:t>4/21/2025</a:t>
+              <a:t>4/25/2025</a:t>
             </a:fld>
             <a:endParaRPr lang="en-US"/>
           </a:p>
@@ -4087,6 +4089,1995 @@
 </p:sld>
 </file>
 
+<file path=ppt/slides/slide2.xml><?xml version="1.0" encoding="utf-8"?>
+<p:sld xmlns:a="http://schemas.openxmlformats.org/drawingml/2006/main" xmlns:r="http://schemas.openxmlformats.org/officeDocument/2006/relationships" xmlns:p="http://schemas.openxmlformats.org/presentationml/2006/main">
+  <p:cSld>
+    <p:spTree>
+      <p:nvGrpSpPr>
+        <p:cNvPr id="1" name=""/>
+        <p:cNvGrpSpPr/>
+        <p:nvPr/>
+      </p:nvGrpSpPr>
+      <p:grpSpPr>
+        <a:xfrm>
+          <a:off x="0" y="0"/>
+          <a:ext cx="0" cy="0"/>
+          <a:chOff x="0" y="0"/>
+          <a:chExt cx="0" cy="0"/>
+        </a:xfrm>
+      </p:grpSpPr>
+      <p:sp>
+        <p:nvSpPr>
+          <p:cNvPr id="2" name="Rectangle: Rounded Corners 1">
+            <a:extLst>
+              <a:ext uri="{FF2B5EF4-FFF2-40B4-BE49-F238E27FC236}">
+                <a16:creationId xmlns:a16="http://schemas.microsoft.com/office/drawing/2014/main" id="{8636FD48-3F43-F334-EA4A-60553BE8BD74}"/>
+              </a:ext>
+            </a:extLst>
+          </p:cNvPr>
+          <p:cNvSpPr/>
+          <p:nvPr/>
+        </p:nvSpPr>
+        <p:spPr>
+          <a:xfrm>
+            <a:off x="4321264" y="2354495"/>
+            <a:ext cx="3553686" cy="1574354"/>
+          </a:xfrm>
+          <a:prstGeom prst="roundRect">
+            <a:avLst>
+              <a:gd name="adj" fmla="val 2995"/>
+            </a:avLst>
+          </a:prstGeom>
+          <a:noFill/>
+        </p:spPr>
+        <p:style>
+          <a:lnRef idx="2">
+            <a:schemeClr val="accent1">
+              <a:shade val="15000"/>
+            </a:schemeClr>
+          </a:lnRef>
+          <a:fillRef idx="1">
+            <a:schemeClr val="accent1"/>
+          </a:fillRef>
+          <a:effectRef idx="0">
+            <a:schemeClr val="accent1"/>
+          </a:effectRef>
+          <a:fontRef idx="minor">
+            <a:schemeClr val="lt1"/>
+          </a:fontRef>
+        </p:style>
+        <p:txBody>
+          <a:bodyPr rtlCol="0" anchor="t"/>
+          <a:lstStyle/>
+          <a:p>
+            <a:pPr algn="ctr"/>
+            <a:r>
+              <a:rPr lang="en-US" dirty="0">
+                <a:solidFill>
+                  <a:schemeClr val="tx1">
+                    <a:lumMod val="85000"/>
+                    <a:lumOff val="15000"/>
+                  </a:schemeClr>
+                </a:solidFill>
+              </a:rPr>
+              <a:t>Feed Forward</a:t>
+            </a:r>
+          </a:p>
+        </p:txBody>
+      </p:sp>
+      <p:sp>
+        <p:nvSpPr>
+          <p:cNvPr id="3" name="Rectangle: Rounded Corners 2">
+            <a:extLst>
+              <a:ext uri="{FF2B5EF4-FFF2-40B4-BE49-F238E27FC236}">
+                <a16:creationId xmlns:a16="http://schemas.microsoft.com/office/drawing/2014/main" id="{396ACF62-4549-7167-A162-87B5E8822732}"/>
+              </a:ext>
+            </a:extLst>
+          </p:cNvPr>
+          <p:cNvSpPr/>
+          <p:nvPr/>
+        </p:nvSpPr>
+        <p:spPr>
+          <a:xfrm>
+            <a:off x="5902718" y="4664038"/>
+            <a:ext cx="1972235" cy="369393"/>
+          </a:xfrm>
+          <a:prstGeom prst="roundRect">
+            <a:avLst/>
+          </a:prstGeom>
+          <a:solidFill>
+            <a:srgbClr val="FDE3B7"/>
+          </a:solidFill>
+        </p:spPr>
+        <p:style>
+          <a:lnRef idx="2">
+            <a:schemeClr val="accent1">
+              <a:shade val="15000"/>
+            </a:schemeClr>
+          </a:lnRef>
+          <a:fillRef idx="1">
+            <a:schemeClr val="accent1"/>
+          </a:fillRef>
+          <a:effectRef idx="0">
+            <a:schemeClr val="accent1"/>
+          </a:effectRef>
+          <a:fontRef idx="minor">
+            <a:schemeClr val="lt1"/>
+          </a:fontRef>
+        </p:style>
+        <p:txBody>
+          <a:bodyPr rtlCol="0" anchor="ctr"/>
+          <a:lstStyle/>
+          <a:p>
+            <a:pPr algn="ctr"/>
+            <a:r>
+              <a:rPr lang="en-US" dirty="0">
+                <a:solidFill>
+                  <a:schemeClr val="tx1">
+                    <a:lumMod val="85000"/>
+                    <a:lumOff val="15000"/>
+                  </a:schemeClr>
+                </a:solidFill>
+              </a:rPr>
+              <a:t>Electra-small</a:t>
+            </a:r>
+          </a:p>
+        </p:txBody>
+      </p:sp>
+      <p:sp>
+        <p:nvSpPr>
+          <p:cNvPr id="4" name="Flowchart: Document 3">
+            <a:extLst>
+              <a:ext uri="{FF2B5EF4-FFF2-40B4-BE49-F238E27FC236}">
+                <a16:creationId xmlns:a16="http://schemas.microsoft.com/office/drawing/2014/main" id="{A62EC688-1639-884A-6C11-81BC5D2E33D2}"/>
+              </a:ext>
+            </a:extLst>
+          </p:cNvPr>
+          <p:cNvSpPr/>
+          <p:nvPr/>
+        </p:nvSpPr>
+        <p:spPr>
+          <a:xfrm>
+            <a:off x="5902716" y="4138379"/>
+            <a:ext cx="1972234" cy="323549"/>
+          </a:xfrm>
+          <a:prstGeom prst="flowChartDocument">
+            <a:avLst/>
+          </a:prstGeom>
+          <a:solidFill>
+            <a:srgbClr val="CCE7CE"/>
+          </a:solidFill>
+        </p:spPr>
+        <p:style>
+          <a:lnRef idx="2">
+            <a:schemeClr val="accent1">
+              <a:shade val="15000"/>
+            </a:schemeClr>
+          </a:lnRef>
+          <a:fillRef idx="1">
+            <a:schemeClr val="accent1"/>
+          </a:fillRef>
+          <a:effectRef idx="0">
+            <a:schemeClr val="accent1"/>
+          </a:effectRef>
+          <a:fontRef idx="minor">
+            <a:schemeClr val="lt1"/>
+          </a:fontRef>
+        </p:style>
+        <p:txBody>
+          <a:bodyPr rtlCol="0" anchor="ctr"/>
+          <a:lstStyle/>
+          <a:p>
+            <a:pPr algn="ctr"/>
+            <a:r>
+              <a:rPr lang="en-US" dirty="0">
+                <a:solidFill>
+                  <a:schemeClr val="tx1">
+                    <a:lumMod val="85000"/>
+                    <a:lumOff val="15000"/>
+                  </a:schemeClr>
+                </a:solidFill>
+              </a:rPr>
+              <a:t>Predictions</a:t>
+            </a:r>
+          </a:p>
+        </p:txBody>
+      </p:sp>
+      <p:cxnSp>
+        <p:nvCxnSpPr>
+          <p:cNvPr id="5" name="Straight Arrow Connector 4">
+            <a:extLst>
+              <a:ext uri="{FF2B5EF4-FFF2-40B4-BE49-F238E27FC236}">
+                <a16:creationId xmlns:a16="http://schemas.microsoft.com/office/drawing/2014/main" id="{F201B977-B4ED-CFD7-BC3C-22B0B8ED1179}"/>
+              </a:ext>
+            </a:extLst>
+          </p:cNvPr>
+          <p:cNvCxnSpPr>
+            <a:cxnSpLocks/>
+            <a:stCxn id="3" idx="0"/>
+            <a:endCxn id="4" idx="2"/>
+          </p:cNvCxnSpPr>
+          <p:nvPr/>
+        </p:nvCxnSpPr>
+        <p:spPr>
+          <a:xfrm flipH="1" flipV="1">
+            <a:off x="6888833" y="4440538"/>
+            <a:ext cx="3" cy="223500"/>
+          </a:xfrm>
+          <a:prstGeom prst="straightConnector1">
+            <a:avLst/>
+          </a:prstGeom>
+          <a:ln>
+            <a:solidFill>
+              <a:schemeClr val="tx1">
+                <a:lumMod val="85000"/>
+                <a:lumOff val="15000"/>
+              </a:schemeClr>
+            </a:solidFill>
+            <a:tailEnd type="stealth"/>
+          </a:ln>
+        </p:spPr>
+        <p:style>
+          <a:lnRef idx="2">
+            <a:schemeClr val="accent1"/>
+          </a:lnRef>
+          <a:fillRef idx="0">
+            <a:schemeClr val="accent1"/>
+          </a:fillRef>
+          <a:effectRef idx="1">
+            <a:schemeClr val="accent1"/>
+          </a:effectRef>
+          <a:fontRef idx="minor">
+            <a:schemeClr val="tx1"/>
+          </a:fontRef>
+        </p:style>
+      </p:cxnSp>
+      <p:cxnSp>
+        <p:nvCxnSpPr>
+          <p:cNvPr id="6" name="Straight Arrow Connector 5">
+            <a:extLst>
+              <a:ext uri="{FF2B5EF4-FFF2-40B4-BE49-F238E27FC236}">
+                <a16:creationId xmlns:a16="http://schemas.microsoft.com/office/drawing/2014/main" id="{04340EBA-84DA-CCE3-D995-22E500F59E09}"/>
+              </a:ext>
+            </a:extLst>
+          </p:cNvPr>
+          <p:cNvCxnSpPr>
+            <a:cxnSpLocks/>
+            <a:stCxn id="4" idx="0"/>
+          </p:cNvCxnSpPr>
+          <p:nvPr/>
+        </p:nvCxnSpPr>
+        <p:spPr>
+          <a:xfrm flipH="1" flipV="1">
+            <a:off x="6888830" y="3914879"/>
+            <a:ext cx="3" cy="223500"/>
+          </a:xfrm>
+          <a:prstGeom prst="straightConnector1">
+            <a:avLst/>
+          </a:prstGeom>
+          <a:ln>
+            <a:solidFill>
+              <a:schemeClr val="tx1">
+                <a:lumMod val="85000"/>
+                <a:lumOff val="15000"/>
+              </a:schemeClr>
+            </a:solidFill>
+            <a:tailEnd type="stealth"/>
+          </a:ln>
+        </p:spPr>
+        <p:style>
+          <a:lnRef idx="2">
+            <a:schemeClr val="accent1"/>
+          </a:lnRef>
+          <a:fillRef idx="0">
+            <a:schemeClr val="accent1"/>
+          </a:fillRef>
+          <a:effectRef idx="1">
+            <a:schemeClr val="accent1"/>
+          </a:effectRef>
+          <a:fontRef idx="minor">
+            <a:schemeClr val="tx1"/>
+          </a:fontRef>
+        </p:style>
+      </p:cxnSp>
+      <p:sp>
+        <p:nvSpPr>
+          <p:cNvPr id="7" name="TextBox 6">
+            <a:extLst>
+              <a:ext uri="{FF2B5EF4-FFF2-40B4-BE49-F238E27FC236}">
+                <a16:creationId xmlns:a16="http://schemas.microsoft.com/office/drawing/2014/main" id="{B1EA8FD2-FCA1-E899-B7B0-2302F7D4B62E}"/>
+              </a:ext>
+            </a:extLst>
+          </p:cNvPr>
+          <p:cNvSpPr txBox="1"/>
+          <p:nvPr/>
+        </p:nvSpPr>
+        <p:spPr>
+          <a:xfrm>
+            <a:off x="4439788" y="4208280"/>
+            <a:ext cx="948253" cy="646331"/>
+          </a:xfrm>
+          <a:prstGeom prst="rect">
+            <a:avLst/>
+          </a:prstGeom>
+          <a:noFill/>
+        </p:spPr>
+        <p:txBody>
+          <a:bodyPr wrap="square" rtlCol="0">
+            <a:spAutoFit/>
+          </a:bodyPr>
+          <a:lstStyle/>
+          <a:p>
+            <a:r>
+              <a:rPr lang="en-US" dirty="0"/>
+              <a:t>custom feature</a:t>
+            </a:r>
+          </a:p>
+        </p:txBody>
+      </p:sp>
+      <p:cxnSp>
+        <p:nvCxnSpPr>
+          <p:cNvPr id="8" name="Straight Connector 7">
+            <a:extLst>
+              <a:ext uri="{FF2B5EF4-FFF2-40B4-BE49-F238E27FC236}">
+                <a16:creationId xmlns:a16="http://schemas.microsoft.com/office/drawing/2014/main" id="{0DA4D33B-D517-8930-D983-5078BAEE2D94}"/>
+              </a:ext>
+            </a:extLst>
+          </p:cNvPr>
+          <p:cNvCxnSpPr/>
+          <p:nvPr/>
+        </p:nvCxnSpPr>
+        <p:spPr>
+          <a:xfrm>
+            <a:off x="4409024" y="4184600"/>
+            <a:ext cx="1002485" cy="0"/>
+          </a:xfrm>
+          <a:prstGeom prst="line">
+            <a:avLst/>
+          </a:prstGeom>
+          <a:ln>
+            <a:solidFill>
+              <a:schemeClr val="tx1">
+                <a:lumMod val="95000"/>
+                <a:lumOff val="5000"/>
+              </a:schemeClr>
+            </a:solidFill>
+          </a:ln>
+        </p:spPr>
+        <p:style>
+          <a:lnRef idx="2">
+            <a:schemeClr val="accent1"/>
+          </a:lnRef>
+          <a:fillRef idx="0">
+            <a:schemeClr val="accent1"/>
+          </a:fillRef>
+          <a:effectRef idx="1">
+            <a:schemeClr val="accent1"/>
+          </a:effectRef>
+          <a:fontRef idx="minor">
+            <a:schemeClr val="tx1"/>
+          </a:fontRef>
+        </p:style>
+      </p:cxnSp>
+      <p:cxnSp>
+        <p:nvCxnSpPr>
+          <p:cNvPr id="9" name="Straight Arrow Connector 8">
+            <a:extLst>
+              <a:ext uri="{FF2B5EF4-FFF2-40B4-BE49-F238E27FC236}">
+                <a16:creationId xmlns:a16="http://schemas.microsoft.com/office/drawing/2014/main" id="{C3225DB8-D5F6-8B7A-AEF0-12F36ED95098}"/>
+              </a:ext>
+            </a:extLst>
+          </p:cNvPr>
+          <p:cNvCxnSpPr>
+            <a:cxnSpLocks/>
+          </p:cNvCxnSpPr>
+          <p:nvPr/>
+        </p:nvCxnSpPr>
+        <p:spPr>
+          <a:xfrm flipV="1">
+            <a:off x="4910266" y="3921414"/>
+            <a:ext cx="0" cy="256886"/>
+          </a:xfrm>
+          <a:prstGeom prst="straightConnector1">
+            <a:avLst/>
+          </a:prstGeom>
+          <a:ln>
+            <a:solidFill>
+              <a:schemeClr val="tx1">
+                <a:lumMod val="85000"/>
+                <a:lumOff val="15000"/>
+              </a:schemeClr>
+            </a:solidFill>
+            <a:tailEnd type="stealth"/>
+          </a:ln>
+        </p:spPr>
+        <p:style>
+          <a:lnRef idx="2">
+            <a:schemeClr val="accent1"/>
+          </a:lnRef>
+          <a:fillRef idx="0">
+            <a:schemeClr val="accent1"/>
+          </a:fillRef>
+          <a:effectRef idx="1">
+            <a:schemeClr val="accent1"/>
+          </a:effectRef>
+          <a:fontRef idx="minor">
+            <a:schemeClr val="tx1"/>
+          </a:fontRef>
+        </p:style>
+      </p:cxnSp>
+      <p:cxnSp>
+        <p:nvCxnSpPr>
+          <p:cNvPr id="10" name="Straight Arrow Connector 9">
+            <a:extLst>
+              <a:ext uri="{FF2B5EF4-FFF2-40B4-BE49-F238E27FC236}">
+                <a16:creationId xmlns:a16="http://schemas.microsoft.com/office/drawing/2014/main" id="{DC863B37-C71D-FE98-FE7C-ECC574A13DBF}"/>
+              </a:ext>
+            </a:extLst>
+          </p:cNvPr>
+          <p:cNvCxnSpPr>
+            <a:cxnSpLocks/>
+            <a:stCxn id="2" idx="0"/>
+            <a:endCxn id="11" idx="2"/>
+          </p:cNvCxnSpPr>
+          <p:nvPr/>
+        </p:nvCxnSpPr>
+        <p:spPr>
+          <a:xfrm flipH="1" flipV="1">
+            <a:off x="6096000" y="2123158"/>
+            <a:ext cx="2107" cy="231337"/>
+          </a:xfrm>
+          <a:prstGeom prst="straightConnector1">
+            <a:avLst/>
+          </a:prstGeom>
+          <a:ln>
+            <a:solidFill>
+              <a:schemeClr val="tx1">
+                <a:lumMod val="85000"/>
+                <a:lumOff val="15000"/>
+              </a:schemeClr>
+            </a:solidFill>
+            <a:tailEnd type="stealth"/>
+          </a:ln>
+        </p:spPr>
+        <p:style>
+          <a:lnRef idx="2">
+            <a:schemeClr val="accent1"/>
+          </a:lnRef>
+          <a:fillRef idx="0">
+            <a:schemeClr val="accent1"/>
+          </a:fillRef>
+          <a:effectRef idx="1">
+            <a:schemeClr val="accent1"/>
+          </a:effectRef>
+          <a:fontRef idx="minor">
+            <a:schemeClr val="tx1"/>
+          </a:fontRef>
+        </p:style>
+      </p:cxnSp>
+      <p:sp>
+        <p:nvSpPr>
+          <p:cNvPr id="11" name="Flowchart: Document 10">
+            <a:extLst>
+              <a:ext uri="{FF2B5EF4-FFF2-40B4-BE49-F238E27FC236}">
+                <a16:creationId xmlns:a16="http://schemas.microsoft.com/office/drawing/2014/main" id="{B8317237-3A9C-61CF-E2D0-3A44F7E7C529}"/>
+              </a:ext>
+            </a:extLst>
+          </p:cNvPr>
+          <p:cNvSpPr/>
+          <p:nvPr/>
+        </p:nvSpPr>
+        <p:spPr>
+          <a:xfrm>
+            <a:off x="5218466" y="1828397"/>
+            <a:ext cx="1755068" cy="315628"/>
+          </a:xfrm>
+          <a:prstGeom prst="flowChartDocument">
+            <a:avLst/>
+          </a:prstGeom>
+          <a:solidFill>
+            <a:srgbClr val="CCE7CE"/>
+          </a:solidFill>
+        </p:spPr>
+        <p:style>
+          <a:lnRef idx="2">
+            <a:schemeClr val="accent1">
+              <a:shade val="15000"/>
+            </a:schemeClr>
+          </a:lnRef>
+          <a:fillRef idx="1">
+            <a:schemeClr val="accent1"/>
+          </a:fillRef>
+          <a:effectRef idx="0">
+            <a:schemeClr val="accent1"/>
+          </a:effectRef>
+          <a:fontRef idx="minor">
+            <a:schemeClr val="lt1"/>
+          </a:fontRef>
+        </p:style>
+        <p:txBody>
+          <a:bodyPr rtlCol="0" anchor="ctr"/>
+          <a:lstStyle/>
+          <a:p>
+            <a:pPr algn="ctr"/>
+            <a:r>
+              <a:rPr lang="en-US" dirty="0">
+                <a:solidFill>
+                  <a:schemeClr val="tx1">
+                    <a:lumMod val="85000"/>
+                    <a:lumOff val="15000"/>
+                  </a:schemeClr>
+                </a:solidFill>
+              </a:rPr>
+              <a:t>Embeddings</a:t>
+            </a:r>
+          </a:p>
+        </p:txBody>
+      </p:sp>
+      <p:sp>
+        <p:nvSpPr>
+          <p:cNvPr id="12" name="Rectangle: Rounded Corners 11">
+            <a:extLst>
+              <a:ext uri="{FF2B5EF4-FFF2-40B4-BE49-F238E27FC236}">
+                <a16:creationId xmlns:a16="http://schemas.microsoft.com/office/drawing/2014/main" id="{26B69496-CDF7-D356-E4DE-A9E38E2EBE74}"/>
+              </a:ext>
+            </a:extLst>
+          </p:cNvPr>
+          <p:cNvSpPr/>
+          <p:nvPr/>
+        </p:nvSpPr>
+        <p:spPr>
+          <a:xfrm>
+            <a:off x="5123781" y="3525346"/>
+            <a:ext cx="1982539" cy="290705"/>
+          </a:xfrm>
+          <a:prstGeom prst="roundRect">
+            <a:avLst/>
+          </a:prstGeom>
+          <a:solidFill>
+            <a:srgbClr val="C2E8F7"/>
+          </a:solidFill>
+        </p:spPr>
+        <p:style>
+          <a:lnRef idx="2">
+            <a:schemeClr val="accent1">
+              <a:shade val="15000"/>
+            </a:schemeClr>
+          </a:lnRef>
+          <a:fillRef idx="1">
+            <a:schemeClr val="accent1"/>
+          </a:fillRef>
+          <a:effectRef idx="0">
+            <a:schemeClr val="accent1"/>
+          </a:effectRef>
+          <a:fontRef idx="minor">
+            <a:schemeClr val="lt1"/>
+          </a:fontRef>
+        </p:style>
+        <p:txBody>
+          <a:bodyPr rtlCol="0" anchor="ctr"/>
+          <a:lstStyle/>
+          <a:p>
+            <a:pPr algn="ctr"/>
+            <a:r>
+              <a:rPr lang="en-US" sz="1600" dirty="0">
+                <a:solidFill>
+                  <a:schemeClr val="tx1">
+                    <a:lumMod val="85000"/>
+                    <a:lumOff val="15000"/>
+                  </a:schemeClr>
+                </a:solidFill>
+              </a:rPr>
+              <a:t>Linear [4x6]</a:t>
+            </a:r>
+          </a:p>
+        </p:txBody>
+      </p:sp>
+      <p:sp>
+        <p:nvSpPr>
+          <p:cNvPr id="13" name="Rectangle: Rounded Corners 12">
+            <a:extLst>
+              <a:ext uri="{FF2B5EF4-FFF2-40B4-BE49-F238E27FC236}">
+                <a16:creationId xmlns:a16="http://schemas.microsoft.com/office/drawing/2014/main" id="{FF41F348-6761-68F1-505F-599B4CE94665}"/>
+              </a:ext>
+            </a:extLst>
+          </p:cNvPr>
+          <p:cNvSpPr/>
+          <p:nvPr/>
+        </p:nvSpPr>
+        <p:spPr>
+          <a:xfrm>
+            <a:off x="5129940" y="3156133"/>
+            <a:ext cx="1982539" cy="290705"/>
+          </a:xfrm>
+          <a:prstGeom prst="roundRect">
+            <a:avLst/>
+          </a:prstGeom>
+          <a:solidFill>
+            <a:srgbClr val="C2E8F7"/>
+          </a:solidFill>
+        </p:spPr>
+        <p:style>
+          <a:lnRef idx="2">
+            <a:schemeClr val="accent1">
+              <a:shade val="15000"/>
+            </a:schemeClr>
+          </a:lnRef>
+          <a:fillRef idx="1">
+            <a:schemeClr val="accent1"/>
+          </a:fillRef>
+          <a:effectRef idx="0">
+            <a:schemeClr val="accent1"/>
+          </a:effectRef>
+          <a:fontRef idx="minor">
+            <a:schemeClr val="lt1"/>
+          </a:fontRef>
+        </p:style>
+        <p:txBody>
+          <a:bodyPr rtlCol="0" anchor="ctr"/>
+          <a:lstStyle/>
+          <a:p>
+            <a:pPr algn="ctr"/>
+            <a:r>
+              <a:rPr lang="en-US" sz="1600" dirty="0">
+                <a:solidFill>
+                  <a:schemeClr val="tx1">
+                    <a:lumMod val="85000"/>
+                    <a:lumOff val="15000"/>
+                  </a:schemeClr>
+                </a:solidFill>
+              </a:rPr>
+              <a:t>ELU</a:t>
+            </a:r>
+          </a:p>
+        </p:txBody>
+      </p:sp>
+      <p:sp>
+        <p:nvSpPr>
+          <p:cNvPr id="14" name="Rectangle: Rounded Corners 13">
+            <a:extLst>
+              <a:ext uri="{FF2B5EF4-FFF2-40B4-BE49-F238E27FC236}">
+                <a16:creationId xmlns:a16="http://schemas.microsoft.com/office/drawing/2014/main" id="{1E44B48C-DB6C-25F2-8143-6A89E0783488}"/>
+              </a:ext>
+            </a:extLst>
+          </p:cNvPr>
+          <p:cNvSpPr/>
+          <p:nvPr/>
+        </p:nvSpPr>
+        <p:spPr>
+          <a:xfrm>
+            <a:off x="5123781" y="2786920"/>
+            <a:ext cx="1982539" cy="290705"/>
+          </a:xfrm>
+          <a:prstGeom prst="roundRect">
+            <a:avLst/>
+          </a:prstGeom>
+          <a:solidFill>
+            <a:srgbClr val="C2E8F7"/>
+          </a:solidFill>
+        </p:spPr>
+        <p:style>
+          <a:lnRef idx="2">
+            <a:schemeClr val="accent1">
+              <a:shade val="15000"/>
+            </a:schemeClr>
+          </a:lnRef>
+          <a:fillRef idx="1">
+            <a:schemeClr val="accent1"/>
+          </a:fillRef>
+          <a:effectRef idx="0">
+            <a:schemeClr val="accent1"/>
+          </a:effectRef>
+          <a:fontRef idx="minor">
+            <a:schemeClr val="lt1"/>
+          </a:fontRef>
+        </p:style>
+        <p:txBody>
+          <a:bodyPr rtlCol="0" anchor="ctr"/>
+          <a:lstStyle/>
+          <a:p>
+            <a:pPr algn="ctr"/>
+            <a:r>
+              <a:rPr lang="en-US" sz="1600" dirty="0">
+                <a:solidFill>
+                  <a:schemeClr val="tx1">
+                    <a:lumMod val="85000"/>
+                    <a:lumOff val="15000"/>
+                  </a:schemeClr>
+                </a:solidFill>
+              </a:rPr>
+              <a:t>Linear [6x3]</a:t>
+            </a:r>
+          </a:p>
+        </p:txBody>
+      </p:sp>
+      <p:sp>
+        <p:nvSpPr>
+          <p:cNvPr id="15" name="Rectangle: Rounded Corners 14">
+            <a:extLst>
+              <a:ext uri="{FF2B5EF4-FFF2-40B4-BE49-F238E27FC236}">
+                <a16:creationId xmlns:a16="http://schemas.microsoft.com/office/drawing/2014/main" id="{30CC1C35-3B6F-AABE-A9DD-7F82FFE9379B}"/>
+              </a:ext>
+            </a:extLst>
+          </p:cNvPr>
+          <p:cNvSpPr/>
+          <p:nvPr/>
+        </p:nvSpPr>
+        <p:spPr>
+          <a:xfrm>
+            <a:off x="5218466" y="1335051"/>
+            <a:ext cx="1755068" cy="251503"/>
+          </a:xfrm>
+          <a:prstGeom prst="roundRect">
+            <a:avLst/>
+          </a:prstGeom>
+          <a:solidFill>
+            <a:srgbClr val="DBDFEE"/>
+          </a:solidFill>
+        </p:spPr>
+        <p:style>
+          <a:lnRef idx="2">
+            <a:schemeClr val="accent1">
+              <a:shade val="15000"/>
+            </a:schemeClr>
+          </a:lnRef>
+          <a:fillRef idx="1">
+            <a:schemeClr val="accent1"/>
+          </a:fillRef>
+          <a:effectRef idx="0">
+            <a:schemeClr val="accent1"/>
+          </a:effectRef>
+          <a:fontRef idx="minor">
+            <a:schemeClr val="lt1"/>
+          </a:fontRef>
+        </p:style>
+        <p:txBody>
+          <a:bodyPr rtlCol="0" anchor="ctr"/>
+          <a:lstStyle/>
+          <a:p>
+            <a:pPr algn="ctr"/>
+            <a:r>
+              <a:rPr lang="en-US" dirty="0">
+                <a:solidFill>
+                  <a:schemeClr val="tx1">
+                    <a:lumMod val="85000"/>
+                    <a:lumOff val="15000"/>
+                  </a:schemeClr>
+                </a:solidFill>
+              </a:rPr>
+              <a:t>argmax</a:t>
+            </a:r>
+          </a:p>
+        </p:txBody>
+      </p:sp>
+      <p:cxnSp>
+        <p:nvCxnSpPr>
+          <p:cNvPr id="16" name="Straight Arrow Connector 15">
+            <a:extLst>
+              <a:ext uri="{FF2B5EF4-FFF2-40B4-BE49-F238E27FC236}">
+                <a16:creationId xmlns:a16="http://schemas.microsoft.com/office/drawing/2014/main" id="{F88436CB-0649-4C43-C4AF-16E7123480C0}"/>
+              </a:ext>
+            </a:extLst>
+          </p:cNvPr>
+          <p:cNvCxnSpPr>
+            <a:cxnSpLocks/>
+            <a:stCxn id="11" idx="0"/>
+            <a:endCxn id="15" idx="2"/>
+          </p:cNvCxnSpPr>
+          <p:nvPr/>
+        </p:nvCxnSpPr>
+        <p:spPr>
+          <a:xfrm flipV="1">
+            <a:off x="6096000" y="1586554"/>
+            <a:ext cx="0" cy="241843"/>
+          </a:xfrm>
+          <a:prstGeom prst="straightConnector1">
+            <a:avLst/>
+          </a:prstGeom>
+          <a:ln>
+            <a:solidFill>
+              <a:schemeClr val="tx1">
+                <a:lumMod val="85000"/>
+                <a:lumOff val="15000"/>
+              </a:schemeClr>
+            </a:solidFill>
+            <a:tailEnd type="stealth"/>
+          </a:ln>
+        </p:spPr>
+        <p:style>
+          <a:lnRef idx="2">
+            <a:schemeClr val="accent1"/>
+          </a:lnRef>
+          <a:fillRef idx="0">
+            <a:schemeClr val="accent1"/>
+          </a:fillRef>
+          <a:effectRef idx="1">
+            <a:schemeClr val="accent1"/>
+          </a:effectRef>
+          <a:fontRef idx="minor">
+            <a:schemeClr val="tx1"/>
+          </a:fontRef>
+        </p:style>
+      </p:cxnSp>
+      <p:sp>
+        <p:nvSpPr>
+          <p:cNvPr id="17" name="Rectangle: Rounded Corners 16">
+            <a:extLst>
+              <a:ext uri="{FF2B5EF4-FFF2-40B4-BE49-F238E27FC236}">
+                <a16:creationId xmlns:a16="http://schemas.microsoft.com/office/drawing/2014/main" id="{CE6C118B-E983-FCA9-91C2-DCCA64D334C2}"/>
+              </a:ext>
+            </a:extLst>
+          </p:cNvPr>
+          <p:cNvSpPr/>
+          <p:nvPr/>
+        </p:nvSpPr>
+        <p:spPr>
+          <a:xfrm>
+            <a:off x="4102101" y="1198032"/>
+            <a:ext cx="3996266" cy="3966633"/>
+          </a:xfrm>
+          <a:prstGeom prst="roundRect">
+            <a:avLst>
+              <a:gd name="adj" fmla="val 534"/>
+            </a:avLst>
+          </a:prstGeom>
+          <a:noFill/>
+          <a:ln>
+            <a:solidFill>
+              <a:schemeClr val="bg1">
+                <a:lumMod val="85000"/>
+              </a:schemeClr>
+            </a:solidFill>
+          </a:ln>
+        </p:spPr>
+        <p:style>
+          <a:lnRef idx="2">
+            <a:schemeClr val="accent1">
+              <a:shade val="15000"/>
+            </a:schemeClr>
+          </a:lnRef>
+          <a:fillRef idx="1">
+            <a:schemeClr val="accent1"/>
+          </a:fillRef>
+          <a:effectRef idx="0">
+            <a:schemeClr val="accent1"/>
+          </a:effectRef>
+          <a:fontRef idx="minor">
+            <a:schemeClr val="lt1"/>
+          </a:fontRef>
+        </p:style>
+        <p:txBody>
+          <a:bodyPr rtlCol="0" anchor="ctr"/>
+          <a:lstStyle/>
+          <a:p>
+            <a:pPr algn="ctr"/>
+            <a:endParaRPr lang="en-US"/>
+          </a:p>
+        </p:txBody>
+      </p:sp>
+    </p:spTree>
+    <p:extLst>
+      <p:ext uri="{BB962C8B-B14F-4D97-AF65-F5344CB8AC3E}">
+        <p14:creationId xmlns:p14="http://schemas.microsoft.com/office/powerpoint/2010/main" val="3519167412"/>
+      </p:ext>
+    </p:extLst>
+  </p:cSld>
+  <p:clrMapOvr>
+    <a:masterClrMapping/>
+  </p:clrMapOvr>
+</p:sld>
+</file>
+
+<file path=ppt/slides/slide3.xml><?xml version="1.0" encoding="utf-8"?>
+<p:sld xmlns:a="http://schemas.openxmlformats.org/drawingml/2006/main" xmlns:r="http://schemas.openxmlformats.org/officeDocument/2006/relationships" xmlns:p="http://schemas.openxmlformats.org/presentationml/2006/main">
+  <p:cSld>
+    <p:spTree>
+      <p:nvGrpSpPr>
+        <p:cNvPr id="1" name="">
+          <a:extLst>
+            <a:ext uri="{FF2B5EF4-FFF2-40B4-BE49-F238E27FC236}">
+              <a16:creationId xmlns:a16="http://schemas.microsoft.com/office/drawing/2014/main" id="{F781F2FF-D296-57DB-EA3E-17A39F62540D}"/>
+            </a:ext>
+          </a:extLst>
+        </p:cNvPr>
+        <p:cNvGrpSpPr/>
+        <p:nvPr/>
+      </p:nvGrpSpPr>
+      <p:grpSpPr>
+        <a:xfrm>
+          <a:off x="0" y="0"/>
+          <a:ext cx="0" cy="0"/>
+          <a:chOff x="0" y="0"/>
+          <a:chExt cx="0" cy="0"/>
+        </a:xfrm>
+      </p:grpSpPr>
+      <p:sp>
+        <p:nvSpPr>
+          <p:cNvPr id="2" name="Rectangle: Rounded Corners 1">
+            <a:extLst>
+              <a:ext uri="{FF2B5EF4-FFF2-40B4-BE49-F238E27FC236}">
+                <a16:creationId xmlns:a16="http://schemas.microsoft.com/office/drawing/2014/main" id="{0EC19C1D-8200-A97C-13B8-912F0A10B24F}"/>
+              </a:ext>
+            </a:extLst>
+          </p:cNvPr>
+          <p:cNvSpPr/>
+          <p:nvPr/>
+        </p:nvSpPr>
+        <p:spPr>
+          <a:xfrm>
+            <a:off x="4844643" y="3242881"/>
+            <a:ext cx="2500190" cy="1549825"/>
+          </a:xfrm>
+          <a:prstGeom prst="roundRect">
+            <a:avLst>
+              <a:gd name="adj" fmla="val 2995"/>
+            </a:avLst>
+          </a:prstGeom>
+          <a:noFill/>
+          <a:ln>
+            <a:solidFill>
+              <a:schemeClr val="tx1">
+                <a:lumMod val="75000"/>
+                <a:lumOff val="25000"/>
+              </a:schemeClr>
+            </a:solidFill>
+          </a:ln>
+        </p:spPr>
+        <p:style>
+          <a:lnRef idx="2">
+            <a:schemeClr val="accent1">
+              <a:shade val="15000"/>
+            </a:schemeClr>
+          </a:lnRef>
+          <a:fillRef idx="1">
+            <a:schemeClr val="accent1"/>
+          </a:fillRef>
+          <a:effectRef idx="0">
+            <a:schemeClr val="accent1"/>
+          </a:effectRef>
+          <a:fontRef idx="minor">
+            <a:schemeClr val="lt1"/>
+          </a:fontRef>
+        </p:style>
+        <p:txBody>
+          <a:bodyPr rtlCol="0" anchor="t"/>
+          <a:lstStyle/>
+          <a:p>
+            <a:pPr algn="ctr"/>
+            <a:endParaRPr lang="en-US" dirty="0">
+              <a:solidFill>
+                <a:schemeClr val="tx1">
+                  <a:lumMod val="85000"/>
+                  <a:lumOff val="15000"/>
+                </a:schemeClr>
+              </a:solidFill>
+            </a:endParaRPr>
+          </a:p>
+        </p:txBody>
+      </p:sp>
+      <p:cxnSp>
+        <p:nvCxnSpPr>
+          <p:cNvPr id="10" name="Straight Arrow Connector 9">
+            <a:extLst>
+              <a:ext uri="{FF2B5EF4-FFF2-40B4-BE49-F238E27FC236}">
+                <a16:creationId xmlns:a16="http://schemas.microsoft.com/office/drawing/2014/main" id="{682BF296-A2BF-C40D-B28D-4B038C402BE1}"/>
+              </a:ext>
+            </a:extLst>
+          </p:cNvPr>
+          <p:cNvCxnSpPr>
+            <a:cxnSpLocks/>
+          </p:cNvCxnSpPr>
+          <p:nvPr/>
+        </p:nvCxnSpPr>
+        <p:spPr>
+          <a:xfrm flipH="1" flipV="1">
+            <a:off x="6090807" y="3072429"/>
+            <a:ext cx="7863" cy="230777"/>
+          </a:xfrm>
+          <a:prstGeom prst="straightConnector1">
+            <a:avLst/>
+          </a:prstGeom>
+          <a:ln>
+            <a:solidFill>
+              <a:schemeClr val="tx1">
+                <a:lumMod val="85000"/>
+                <a:lumOff val="15000"/>
+              </a:schemeClr>
+            </a:solidFill>
+            <a:tailEnd type="stealth"/>
+          </a:ln>
+        </p:spPr>
+        <p:style>
+          <a:lnRef idx="2">
+            <a:schemeClr val="accent1"/>
+          </a:lnRef>
+          <a:fillRef idx="0">
+            <a:schemeClr val="accent1"/>
+          </a:fillRef>
+          <a:effectRef idx="1">
+            <a:schemeClr val="accent1"/>
+          </a:effectRef>
+          <a:fontRef idx="minor">
+            <a:schemeClr val="tx1"/>
+          </a:fontRef>
+        </p:style>
+      </p:cxnSp>
+      <p:sp>
+        <p:nvSpPr>
+          <p:cNvPr id="11" name="Flowchart: Document 10">
+            <a:extLst>
+              <a:ext uri="{FF2B5EF4-FFF2-40B4-BE49-F238E27FC236}">
+                <a16:creationId xmlns:a16="http://schemas.microsoft.com/office/drawing/2014/main" id="{43185D74-C894-F356-4195-8330A44A7050}"/>
+              </a:ext>
+            </a:extLst>
+          </p:cNvPr>
+          <p:cNvSpPr/>
+          <p:nvPr/>
+        </p:nvSpPr>
+        <p:spPr>
+          <a:xfrm>
+            <a:off x="5217204" y="1356175"/>
+            <a:ext cx="1755068" cy="315628"/>
+          </a:xfrm>
+          <a:prstGeom prst="flowChartDocument">
+            <a:avLst/>
+          </a:prstGeom>
+          <a:solidFill>
+            <a:srgbClr val="CCE7CE"/>
+          </a:solidFill>
+          <a:ln>
+            <a:solidFill>
+              <a:schemeClr val="tx1">
+                <a:lumMod val="75000"/>
+                <a:lumOff val="25000"/>
+              </a:schemeClr>
+            </a:solidFill>
+          </a:ln>
+        </p:spPr>
+        <p:style>
+          <a:lnRef idx="2">
+            <a:schemeClr val="accent1">
+              <a:shade val="15000"/>
+            </a:schemeClr>
+          </a:lnRef>
+          <a:fillRef idx="1">
+            <a:schemeClr val="accent1"/>
+          </a:fillRef>
+          <a:effectRef idx="0">
+            <a:schemeClr val="accent1"/>
+          </a:effectRef>
+          <a:fontRef idx="minor">
+            <a:schemeClr val="lt1"/>
+          </a:fontRef>
+        </p:style>
+        <p:txBody>
+          <a:bodyPr rtlCol="0" anchor="ctr"/>
+          <a:lstStyle/>
+          <a:p>
+            <a:pPr algn="ctr"/>
+            <a:r>
+              <a:rPr lang="en-US" sz="1600" dirty="0">
+                <a:solidFill>
+                  <a:schemeClr val="tx1">
+                    <a:lumMod val="85000"/>
+                    <a:lumOff val="15000"/>
+                  </a:schemeClr>
+                </a:solidFill>
+              </a:rPr>
+              <a:t>Embeddings</a:t>
+            </a:r>
+          </a:p>
+        </p:txBody>
+      </p:sp>
+      <p:sp>
+        <p:nvSpPr>
+          <p:cNvPr id="12" name="Rectangle: Rounded Corners 11">
+            <a:extLst>
+              <a:ext uri="{FF2B5EF4-FFF2-40B4-BE49-F238E27FC236}">
+                <a16:creationId xmlns:a16="http://schemas.microsoft.com/office/drawing/2014/main" id="{67A8BC1D-15A7-EE1D-6999-45C976E21D58}"/>
+              </a:ext>
+            </a:extLst>
+          </p:cNvPr>
+          <p:cNvSpPr/>
+          <p:nvPr/>
+        </p:nvSpPr>
+        <p:spPr>
+          <a:xfrm>
+            <a:off x="4997179" y="3684248"/>
+            <a:ext cx="2195118" cy="290705"/>
+          </a:xfrm>
+          <a:prstGeom prst="roundRect">
+            <a:avLst/>
+          </a:prstGeom>
+          <a:solidFill>
+            <a:srgbClr val="FDE3B7"/>
+          </a:solidFill>
+          <a:ln>
+            <a:solidFill>
+              <a:schemeClr val="tx1">
+                <a:lumMod val="75000"/>
+                <a:lumOff val="25000"/>
+              </a:schemeClr>
+            </a:solidFill>
+          </a:ln>
+        </p:spPr>
+        <p:style>
+          <a:lnRef idx="2">
+            <a:schemeClr val="accent1">
+              <a:shade val="15000"/>
+            </a:schemeClr>
+          </a:lnRef>
+          <a:fillRef idx="1">
+            <a:schemeClr val="accent1"/>
+          </a:fillRef>
+          <a:effectRef idx="0">
+            <a:schemeClr val="accent1"/>
+          </a:effectRef>
+          <a:fontRef idx="minor">
+            <a:schemeClr val="lt1"/>
+          </a:fontRef>
+        </p:style>
+        <p:txBody>
+          <a:bodyPr rtlCol="0" anchor="ctr"/>
+          <a:lstStyle/>
+          <a:p>
+            <a:pPr algn="ctr"/>
+            <a:r>
+              <a:rPr lang="en-US" sz="1600" dirty="0" err="1">
+                <a:solidFill>
+                  <a:schemeClr val="tx1">
+                    <a:lumMod val="85000"/>
+                    <a:lumOff val="15000"/>
+                  </a:schemeClr>
+                </a:solidFill>
+              </a:rPr>
+              <a:t>GraphConv</a:t>
+            </a:r>
+            <a:r>
+              <a:rPr lang="en-US" sz="1600" dirty="0">
+                <a:solidFill>
+                  <a:schemeClr val="tx1">
+                    <a:lumMod val="85000"/>
+                    <a:lumOff val="15000"/>
+                  </a:schemeClr>
+                </a:solidFill>
+              </a:rPr>
+              <a:t> [64x64]</a:t>
+            </a:r>
+          </a:p>
+        </p:txBody>
+      </p:sp>
+      <p:sp>
+        <p:nvSpPr>
+          <p:cNvPr id="13" name="Rectangle: Rounded Corners 12">
+            <a:extLst>
+              <a:ext uri="{FF2B5EF4-FFF2-40B4-BE49-F238E27FC236}">
+                <a16:creationId xmlns:a16="http://schemas.microsoft.com/office/drawing/2014/main" id="{F10E9C55-80FA-489D-180B-130798C1E809}"/>
+              </a:ext>
+            </a:extLst>
+          </p:cNvPr>
+          <p:cNvSpPr/>
+          <p:nvPr/>
+        </p:nvSpPr>
+        <p:spPr>
+          <a:xfrm>
+            <a:off x="5258394" y="4054374"/>
+            <a:ext cx="1672689" cy="290705"/>
+          </a:xfrm>
+          <a:prstGeom prst="roundRect">
+            <a:avLst/>
+          </a:prstGeom>
+          <a:solidFill>
+            <a:srgbClr val="FDE3B7"/>
+          </a:solidFill>
+          <a:ln>
+            <a:solidFill>
+              <a:schemeClr val="tx1">
+                <a:lumMod val="75000"/>
+                <a:lumOff val="25000"/>
+              </a:schemeClr>
+            </a:solidFill>
+          </a:ln>
+        </p:spPr>
+        <p:style>
+          <a:lnRef idx="2">
+            <a:schemeClr val="accent1">
+              <a:shade val="15000"/>
+            </a:schemeClr>
+          </a:lnRef>
+          <a:fillRef idx="1">
+            <a:schemeClr val="accent1"/>
+          </a:fillRef>
+          <a:effectRef idx="0">
+            <a:schemeClr val="accent1"/>
+          </a:effectRef>
+          <a:fontRef idx="minor">
+            <a:schemeClr val="lt1"/>
+          </a:fontRef>
+        </p:style>
+        <p:txBody>
+          <a:bodyPr rtlCol="0" anchor="ctr"/>
+          <a:lstStyle/>
+          <a:p>
+            <a:pPr algn="ctr"/>
+            <a:r>
+              <a:rPr lang="en-US" sz="1600" dirty="0">
+                <a:solidFill>
+                  <a:schemeClr val="tx1">
+                    <a:lumMod val="85000"/>
+                    <a:lumOff val="15000"/>
+                  </a:schemeClr>
+                </a:solidFill>
+              </a:rPr>
+              <a:t>sum</a:t>
+            </a:r>
+          </a:p>
+        </p:txBody>
+      </p:sp>
+      <p:sp>
+        <p:nvSpPr>
+          <p:cNvPr id="14" name="Rectangle: Rounded Corners 13">
+            <a:extLst>
+              <a:ext uri="{FF2B5EF4-FFF2-40B4-BE49-F238E27FC236}">
+                <a16:creationId xmlns:a16="http://schemas.microsoft.com/office/drawing/2014/main" id="{DD1DE1C3-B436-54FD-C63B-861C4393032D}"/>
+              </a:ext>
+            </a:extLst>
+          </p:cNvPr>
+          <p:cNvSpPr/>
+          <p:nvPr/>
+        </p:nvSpPr>
+        <p:spPr>
+          <a:xfrm>
+            <a:off x="5103469" y="4943152"/>
+            <a:ext cx="1982539" cy="290705"/>
+          </a:xfrm>
+          <a:prstGeom prst="roundRect">
+            <a:avLst/>
+          </a:prstGeom>
+          <a:solidFill>
+            <a:srgbClr val="C2E8F7"/>
+          </a:solidFill>
+          <a:ln>
+            <a:solidFill>
+              <a:schemeClr val="tx1">
+                <a:lumMod val="75000"/>
+                <a:lumOff val="25000"/>
+              </a:schemeClr>
+            </a:solidFill>
+          </a:ln>
+        </p:spPr>
+        <p:style>
+          <a:lnRef idx="2">
+            <a:schemeClr val="accent1">
+              <a:shade val="15000"/>
+            </a:schemeClr>
+          </a:lnRef>
+          <a:fillRef idx="1">
+            <a:schemeClr val="accent1"/>
+          </a:fillRef>
+          <a:effectRef idx="0">
+            <a:schemeClr val="accent1"/>
+          </a:effectRef>
+          <a:fontRef idx="minor">
+            <a:schemeClr val="lt1"/>
+          </a:fontRef>
+        </p:style>
+        <p:txBody>
+          <a:bodyPr rtlCol="0" anchor="ctr"/>
+          <a:lstStyle/>
+          <a:p>
+            <a:pPr algn="ctr"/>
+            <a:r>
+              <a:rPr lang="en-US" sz="1600" dirty="0">
+                <a:solidFill>
+                  <a:schemeClr val="tx1">
+                    <a:lumMod val="85000"/>
+                    <a:lumOff val="15000"/>
+                  </a:schemeClr>
+                </a:solidFill>
+              </a:rPr>
+              <a:t>Graph data</a:t>
+            </a:r>
+          </a:p>
+        </p:txBody>
+      </p:sp>
+      <p:sp>
+        <p:nvSpPr>
+          <p:cNvPr id="17" name="Rectangle: Rounded Corners 16">
+            <a:extLst>
+              <a:ext uri="{FF2B5EF4-FFF2-40B4-BE49-F238E27FC236}">
+                <a16:creationId xmlns:a16="http://schemas.microsoft.com/office/drawing/2014/main" id="{9B8A1CA8-CF57-3FB0-11C5-F638F8BDEFA4}"/>
+              </a:ext>
+            </a:extLst>
+          </p:cNvPr>
+          <p:cNvSpPr/>
+          <p:nvPr/>
+        </p:nvSpPr>
+        <p:spPr>
+          <a:xfrm>
+            <a:off x="4453104" y="1247774"/>
+            <a:ext cx="3116096" cy="4083051"/>
+          </a:xfrm>
+          <a:prstGeom prst="roundRect">
+            <a:avLst>
+              <a:gd name="adj" fmla="val 534"/>
+            </a:avLst>
+          </a:prstGeom>
+          <a:noFill/>
+          <a:ln>
+            <a:solidFill>
+              <a:schemeClr val="bg1">
+                <a:lumMod val="85000"/>
+              </a:schemeClr>
+            </a:solidFill>
+          </a:ln>
+        </p:spPr>
+        <p:style>
+          <a:lnRef idx="2">
+            <a:schemeClr val="accent1">
+              <a:shade val="15000"/>
+            </a:schemeClr>
+          </a:lnRef>
+          <a:fillRef idx="1">
+            <a:schemeClr val="accent1"/>
+          </a:fillRef>
+          <a:effectRef idx="0">
+            <a:schemeClr val="accent1"/>
+          </a:effectRef>
+          <a:fontRef idx="minor">
+            <a:schemeClr val="lt1"/>
+          </a:fontRef>
+        </p:style>
+        <p:txBody>
+          <a:bodyPr rtlCol="0" anchor="ctr"/>
+          <a:lstStyle/>
+          <a:p>
+            <a:pPr algn="ctr"/>
+            <a:endParaRPr lang="en-US"/>
+          </a:p>
+        </p:txBody>
+      </p:sp>
+      <p:sp>
+        <p:nvSpPr>
+          <p:cNvPr id="18" name="Rectangle: Rounded Corners 17">
+            <a:extLst>
+              <a:ext uri="{FF2B5EF4-FFF2-40B4-BE49-F238E27FC236}">
+                <a16:creationId xmlns:a16="http://schemas.microsoft.com/office/drawing/2014/main" id="{5AA35030-0253-197E-D79F-784918888ED3}"/>
+              </a:ext>
+            </a:extLst>
+          </p:cNvPr>
+          <p:cNvSpPr/>
+          <p:nvPr/>
+        </p:nvSpPr>
+        <p:spPr>
+          <a:xfrm>
+            <a:off x="4997179" y="4424501"/>
+            <a:ext cx="2195119" cy="290705"/>
+          </a:xfrm>
+          <a:prstGeom prst="roundRect">
+            <a:avLst/>
+          </a:prstGeom>
+          <a:solidFill>
+            <a:srgbClr val="FDE3B7"/>
+          </a:solidFill>
+          <a:ln>
+            <a:solidFill>
+              <a:schemeClr val="tx1">
+                <a:lumMod val="75000"/>
+                <a:lumOff val="25000"/>
+              </a:schemeClr>
+            </a:solidFill>
+          </a:ln>
+        </p:spPr>
+        <p:style>
+          <a:lnRef idx="2">
+            <a:schemeClr val="accent1">
+              <a:shade val="15000"/>
+            </a:schemeClr>
+          </a:lnRef>
+          <a:fillRef idx="1">
+            <a:schemeClr val="accent1"/>
+          </a:fillRef>
+          <a:effectRef idx="0">
+            <a:schemeClr val="accent1"/>
+          </a:effectRef>
+          <a:fontRef idx="minor">
+            <a:schemeClr val="lt1"/>
+          </a:fontRef>
+        </p:style>
+        <p:txBody>
+          <a:bodyPr rtlCol="0" anchor="ctr"/>
+          <a:lstStyle/>
+          <a:p>
+            <a:pPr algn="ctr"/>
+            <a:r>
+              <a:rPr lang="en-US" sz="1600" dirty="0" err="1">
+                <a:solidFill>
+                  <a:schemeClr val="tx1">
+                    <a:lumMod val="85000"/>
+                    <a:lumOff val="15000"/>
+                  </a:schemeClr>
+                </a:solidFill>
+              </a:rPr>
+              <a:t>GraphConv</a:t>
+            </a:r>
+            <a:r>
+              <a:rPr lang="en-US" sz="1600" dirty="0">
+                <a:solidFill>
+                  <a:schemeClr val="tx1">
+                    <a:lumMod val="85000"/>
+                    <a:lumOff val="15000"/>
+                  </a:schemeClr>
+                </a:solidFill>
+              </a:rPr>
+              <a:t> [-1 x64]</a:t>
+            </a:r>
+          </a:p>
+        </p:txBody>
+      </p:sp>
+      <p:sp>
+        <p:nvSpPr>
+          <p:cNvPr id="25" name="Rectangle: Rounded Corners 24">
+            <a:extLst>
+              <a:ext uri="{FF2B5EF4-FFF2-40B4-BE49-F238E27FC236}">
+                <a16:creationId xmlns:a16="http://schemas.microsoft.com/office/drawing/2014/main" id="{2A966BCE-3FC8-2D06-F699-84C19E5DBF37}"/>
+              </a:ext>
+            </a:extLst>
+          </p:cNvPr>
+          <p:cNvSpPr/>
+          <p:nvPr/>
+        </p:nvSpPr>
+        <p:spPr>
+          <a:xfrm>
+            <a:off x="4844643" y="1795243"/>
+            <a:ext cx="2500190" cy="1277185"/>
+          </a:xfrm>
+          <a:prstGeom prst="roundRect">
+            <a:avLst>
+              <a:gd name="adj" fmla="val 2995"/>
+            </a:avLst>
+          </a:prstGeom>
+          <a:noFill/>
+          <a:ln>
+            <a:solidFill>
+              <a:schemeClr val="tx1">
+                <a:lumMod val="75000"/>
+                <a:lumOff val="25000"/>
+              </a:schemeClr>
+            </a:solidFill>
+          </a:ln>
+        </p:spPr>
+        <p:style>
+          <a:lnRef idx="2">
+            <a:schemeClr val="accent1">
+              <a:shade val="15000"/>
+            </a:schemeClr>
+          </a:lnRef>
+          <a:fillRef idx="1">
+            <a:schemeClr val="accent1"/>
+          </a:fillRef>
+          <a:effectRef idx="0">
+            <a:schemeClr val="accent1"/>
+          </a:effectRef>
+          <a:fontRef idx="minor">
+            <a:schemeClr val="lt1"/>
+          </a:fontRef>
+        </p:style>
+        <p:txBody>
+          <a:bodyPr rtlCol="0" anchor="t"/>
+          <a:lstStyle/>
+          <a:p>
+            <a:pPr algn="ctr"/>
+            <a:endParaRPr lang="en-US" dirty="0">
+              <a:solidFill>
+                <a:schemeClr val="tx1">
+                  <a:lumMod val="85000"/>
+                  <a:lumOff val="15000"/>
+                </a:schemeClr>
+              </a:solidFill>
+            </a:endParaRPr>
+          </a:p>
+        </p:txBody>
+      </p:sp>
+      <p:sp>
+        <p:nvSpPr>
+          <p:cNvPr id="26" name="Rectangle: Rounded Corners 25">
+            <a:extLst>
+              <a:ext uri="{FF2B5EF4-FFF2-40B4-BE49-F238E27FC236}">
+                <a16:creationId xmlns:a16="http://schemas.microsoft.com/office/drawing/2014/main" id="{2D8E050B-D04E-36E0-CE28-37CCACE6DDA4}"/>
+              </a:ext>
+            </a:extLst>
+          </p:cNvPr>
+          <p:cNvSpPr/>
+          <p:nvPr/>
+        </p:nvSpPr>
+        <p:spPr>
+          <a:xfrm>
+            <a:off x="5103469" y="2668209"/>
+            <a:ext cx="1982539" cy="290705"/>
+          </a:xfrm>
+          <a:prstGeom prst="roundRect">
+            <a:avLst/>
+          </a:prstGeom>
+          <a:solidFill>
+            <a:srgbClr val="C2E8F7"/>
+          </a:solidFill>
+          <a:ln>
+            <a:solidFill>
+              <a:schemeClr val="tx1">
+                <a:lumMod val="75000"/>
+                <a:lumOff val="25000"/>
+              </a:schemeClr>
+            </a:solidFill>
+          </a:ln>
+        </p:spPr>
+        <p:style>
+          <a:lnRef idx="2">
+            <a:schemeClr val="accent1">
+              <a:shade val="15000"/>
+            </a:schemeClr>
+          </a:lnRef>
+          <a:fillRef idx="1">
+            <a:schemeClr val="accent1"/>
+          </a:fillRef>
+          <a:effectRef idx="0">
+            <a:schemeClr val="accent1"/>
+          </a:effectRef>
+          <a:fontRef idx="minor">
+            <a:schemeClr val="lt1"/>
+          </a:fontRef>
+        </p:style>
+        <p:txBody>
+          <a:bodyPr rtlCol="0" anchor="ctr"/>
+          <a:lstStyle/>
+          <a:p>
+            <a:pPr algn="ctr"/>
+            <a:r>
+              <a:rPr lang="en-US" sz="1600" dirty="0">
+                <a:solidFill>
+                  <a:schemeClr val="tx1">
+                    <a:lumMod val="85000"/>
+                    <a:lumOff val="15000"/>
+                  </a:schemeClr>
+                </a:solidFill>
+              </a:rPr>
+              <a:t>Linear [64x64]</a:t>
+            </a:r>
+          </a:p>
+        </p:txBody>
+      </p:sp>
+      <p:sp>
+        <p:nvSpPr>
+          <p:cNvPr id="27" name="Rectangle: Rounded Corners 26">
+            <a:extLst>
+              <a:ext uri="{FF2B5EF4-FFF2-40B4-BE49-F238E27FC236}">
+                <a16:creationId xmlns:a16="http://schemas.microsoft.com/office/drawing/2014/main" id="{84E8135A-2E02-4868-B654-1087906CEC25}"/>
+              </a:ext>
+            </a:extLst>
+          </p:cNvPr>
+          <p:cNvSpPr/>
+          <p:nvPr/>
+        </p:nvSpPr>
+        <p:spPr>
+          <a:xfrm>
+            <a:off x="5103469" y="1908768"/>
+            <a:ext cx="1982539" cy="290705"/>
+          </a:xfrm>
+          <a:prstGeom prst="roundRect">
+            <a:avLst/>
+          </a:prstGeom>
+          <a:solidFill>
+            <a:srgbClr val="C2E8F7"/>
+          </a:solidFill>
+          <a:ln>
+            <a:solidFill>
+              <a:schemeClr val="tx1">
+                <a:lumMod val="75000"/>
+                <a:lumOff val="25000"/>
+              </a:schemeClr>
+            </a:solidFill>
+          </a:ln>
+        </p:spPr>
+        <p:style>
+          <a:lnRef idx="2">
+            <a:schemeClr val="accent1">
+              <a:shade val="15000"/>
+            </a:schemeClr>
+          </a:lnRef>
+          <a:fillRef idx="1">
+            <a:schemeClr val="accent1"/>
+          </a:fillRef>
+          <a:effectRef idx="0">
+            <a:schemeClr val="accent1"/>
+          </a:effectRef>
+          <a:fontRef idx="minor">
+            <a:schemeClr val="lt1"/>
+          </a:fontRef>
+        </p:style>
+        <p:txBody>
+          <a:bodyPr rtlCol="0" anchor="ctr"/>
+          <a:lstStyle/>
+          <a:p>
+            <a:pPr algn="ctr"/>
+            <a:r>
+              <a:rPr lang="en-US" sz="1600" dirty="0">
+                <a:solidFill>
+                  <a:schemeClr val="tx1">
+                    <a:lumMod val="85000"/>
+                    <a:lumOff val="15000"/>
+                  </a:schemeClr>
+                </a:solidFill>
+              </a:rPr>
+              <a:t>Linear [64x32]</a:t>
+            </a:r>
+          </a:p>
+        </p:txBody>
+      </p:sp>
+      <p:sp>
+        <p:nvSpPr>
+          <p:cNvPr id="28" name="Rectangle: Rounded Corners 27">
+            <a:extLst>
+              <a:ext uri="{FF2B5EF4-FFF2-40B4-BE49-F238E27FC236}">
+                <a16:creationId xmlns:a16="http://schemas.microsoft.com/office/drawing/2014/main" id="{FAAD746C-D9BA-1C9D-CDC1-243AFAE509FD}"/>
+              </a:ext>
+            </a:extLst>
+          </p:cNvPr>
+          <p:cNvSpPr/>
+          <p:nvPr/>
+        </p:nvSpPr>
+        <p:spPr>
+          <a:xfrm>
+            <a:off x="5258394" y="2288489"/>
+            <a:ext cx="1672689" cy="290705"/>
+          </a:xfrm>
+          <a:prstGeom prst="roundRect">
+            <a:avLst/>
+          </a:prstGeom>
+          <a:solidFill>
+            <a:srgbClr val="C2E8F7"/>
+          </a:solidFill>
+          <a:ln>
+            <a:solidFill>
+              <a:schemeClr val="tx1">
+                <a:lumMod val="75000"/>
+                <a:lumOff val="25000"/>
+              </a:schemeClr>
+            </a:solidFill>
+          </a:ln>
+        </p:spPr>
+        <p:style>
+          <a:lnRef idx="2">
+            <a:schemeClr val="accent1">
+              <a:shade val="15000"/>
+            </a:schemeClr>
+          </a:lnRef>
+          <a:fillRef idx="1">
+            <a:schemeClr val="accent1"/>
+          </a:fillRef>
+          <a:effectRef idx="0">
+            <a:schemeClr val="accent1"/>
+          </a:effectRef>
+          <a:fontRef idx="minor">
+            <a:schemeClr val="lt1"/>
+          </a:fontRef>
+        </p:style>
+        <p:txBody>
+          <a:bodyPr rtlCol="0" anchor="ctr"/>
+          <a:lstStyle/>
+          <a:p>
+            <a:pPr algn="ctr"/>
+            <a:r>
+              <a:rPr lang="en-US" sz="1600" dirty="0">
+                <a:solidFill>
+                  <a:schemeClr val="tx1">
+                    <a:lumMod val="85000"/>
+                    <a:lumOff val="15000"/>
+                  </a:schemeClr>
+                </a:solidFill>
+              </a:rPr>
+              <a:t>Relu</a:t>
+            </a:r>
+          </a:p>
+        </p:txBody>
+      </p:sp>
+      <p:sp>
+        <p:nvSpPr>
+          <p:cNvPr id="33" name="Rectangle: Rounded Corners 32">
+            <a:extLst>
+              <a:ext uri="{FF2B5EF4-FFF2-40B4-BE49-F238E27FC236}">
+                <a16:creationId xmlns:a16="http://schemas.microsoft.com/office/drawing/2014/main" id="{A0FA3138-0F88-F18D-B225-529E0F234590}"/>
+              </a:ext>
+            </a:extLst>
+          </p:cNvPr>
+          <p:cNvSpPr/>
+          <p:nvPr/>
+        </p:nvSpPr>
+        <p:spPr>
+          <a:xfrm>
+            <a:off x="5258394" y="3314122"/>
+            <a:ext cx="1672689" cy="290705"/>
+          </a:xfrm>
+          <a:prstGeom prst="roundRect">
+            <a:avLst/>
+          </a:prstGeom>
+          <a:solidFill>
+            <a:srgbClr val="FDE3B7"/>
+          </a:solidFill>
+          <a:ln>
+            <a:solidFill>
+              <a:schemeClr val="tx1">
+                <a:lumMod val="75000"/>
+                <a:lumOff val="25000"/>
+              </a:schemeClr>
+            </a:solidFill>
+          </a:ln>
+        </p:spPr>
+        <p:style>
+          <a:lnRef idx="2">
+            <a:schemeClr val="accent1">
+              <a:shade val="15000"/>
+            </a:schemeClr>
+          </a:lnRef>
+          <a:fillRef idx="1">
+            <a:schemeClr val="accent1"/>
+          </a:fillRef>
+          <a:effectRef idx="0">
+            <a:schemeClr val="accent1"/>
+          </a:effectRef>
+          <a:fontRef idx="minor">
+            <a:schemeClr val="lt1"/>
+          </a:fontRef>
+        </p:style>
+        <p:txBody>
+          <a:bodyPr rtlCol="0" anchor="ctr"/>
+          <a:lstStyle/>
+          <a:p>
+            <a:pPr algn="ctr"/>
+            <a:r>
+              <a:rPr lang="en-US" sz="1600" dirty="0">
+                <a:solidFill>
+                  <a:schemeClr val="tx1">
+                    <a:lumMod val="85000"/>
+                    <a:lumOff val="15000"/>
+                  </a:schemeClr>
+                </a:solidFill>
+              </a:rPr>
+              <a:t>sum</a:t>
+            </a:r>
+          </a:p>
+        </p:txBody>
+      </p:sp>
+      <p:cxnSp>
+        <p:nvCxnSpPr>
+          <p:cNvPr id="39" name="Straight Arrow Connector 38">
+            <a:extLst>
+              <a:ext uri="{FF2B5EF4-FFF2-40B4-BE49-F238E27FC236}">
+                <a16:creationId xmlns:a16="http://schemas.microsoft.com/office/drawing/2014/main" id="{46DE5134-EC31-E201-0D2A-FB082AA9AEE5}"/>
+              </a:ext>
+            </a:extLst>
+          </p:cNvPr>
+          <p:cNvCxnSpPr>
+            <a:cxnSpLocks/>
+            <a:endCxn id="11" idx="2"/>
+          </p:cNvCxnSpPr>
+          <p:nvPr/>
+        </p:nvCxnSpPr>
+        <p:spPr>
+          <a:xfrm flipV="1">
+            <a:off x="6090807" y="1650936"/>
+            <a:ext cx="3931" cy="144307"/>
+          </a:xfrm>
+          <a:prstGeom prst="straightConnector1">
+            <a:avLst/>
+          </a:prstGeom>
+          <a:ln>
+            <a:solidFill>
+              <a:schemeClr val="tx1">
+                <a:lumMod val="85000"/>
+                <a:lumOff val="15000"/>
+              </a:schemeClr>
+            </a:solidFill>
+            <a:tailEnd type="stealth"/>
+          </a:ln>
+        </p:spPr>
+        <p:style>
+          <a:lnRef idx="2">
+            <a:schemeClr val="accent1"/>
+          </a:lnRef>
+          <a:fillRef idx="0">
+            <a:schemeClr val="accent1"/>
+          </a:fillRef>
+          <a:effectRef idx="1">
+            <a:schemeClr val="accent1"/>
+          </a:effectRef>
+          <a:fontRef idx="minor">
+            <a:schemeClr val="tx1"/>
+          </a:fontRef>
+        </p:style>
+      </p:cxnSp>
+      <p:sp>
+        <p:nvSpPr>
+          <p:cNvPr id="52" name="TextBox 51">
+            <a:extLst>
+              <a:ext uri="{FF2B5EF4-FFF2-40B4-BE49-F238E27FC236}">
+                <a16:creationId xmlns:a16="http://schemas.microsoft.com/office/drawing/2014/main" id="{9038A4DA-6C2C-FDCC-21E4-E085F68D806B}"/>
+              </a:ext>
+            </a:extLst>
+          </p:cNvPr>
+          <p:cNvSpPr txBox="1"/>
+          <p:nvPr/>
+        </p:nvSpPr>
+        <p:spPr>
+          <a:xfrm rot="16200000">
+            <a:off x="3977557" y="3756926"/>
+            <a:ext cx="1320426" cy="369332"/>
+          </a:xfrm>
+          <a:prstGeom prst="rect">
+            <a:avLst/>
+          </a:prstGeom>
+          <a:noFill/>
+        </p:spPr>
+        <p:txBody>
+          <a:bodyPr wrap="none" rtlCol="0">
+            <a:spAutoFit/>
+          </a:bodyPr>
+          <a:lstStyle/>
+          <a:p>
+            <a:r>
+              <a:rPr lang="en-US" dirty="0"/>
+              <a:t>graph conv.</a:t>
+            </a:r>
+          </a:p>
+        </p:txBody>
+      </p:sp>
+      <p:sp>
+        <p:nvSpPr>
+          <p:cNvPr id="53" name="TextBox 52">
+            <a:extLst>
+              <a:ext uri="{FF2B5EF4-FFF2-40B4-BE49-F238E27FC236}">
+                <a16:creationId xmlns:a16="http://schemas.microsoft.com/office/drawing/2014/main" id="{54931D09-8FDD-2510-2130-FF499F1FB8F0}"/>
+              </a:ext>
+            </a:extLst>
+          </p:cNvPr>
+          <p:cNvSpPr txBox="1"/>
+          <p:nvPr/>
+        </p:nvSpPr>
+        <p:spPr>
+          <a:xfrm rot="16200000">
+            <a:off x="3918887" y="2261399"/>
+            <a:ext cx="1437766" cy="369332"/>
+          </a:xfrm>
+          <a:prstGeom prst="rect">
+            <a:avLst/>
+          </a:prstGeom>
+          <a:noFill/>
+        </p:spPr>
+        <p:txBody>
+          <a:bodyPr wrap="none" rtlCol="0">
+            <a:spAutoFit/>
+          </a:bodyPr>
+          <a:lstStyle/>
+          <a:p>
+            <a:r>
+              <a:rPr lang="en-US" dirty="0"/>
+              <a:t>patient head</a:t>
+            </a:r>
+          </a:p>
+        </p:txBody>
+      </p:sp>
+      <p:cxnSp>
+        <p:nvCxnSpPr>
+          <p:cNvPr id="65" name="Connector: Elbow 64">
+            <a:extLst>
+              <a:ext uri="{FF2B5EF4-FFF2-40B4-BE49-F238E27FC236}">
+                <a16:creationId xmlns:a16="http://schemas.microsoft.com/office/drawing/2014/main" id="{8BB6ACD0-2FDC-30C1-F065-ACE54F139A60}"/>
+              </a:ext>
+            </a:extLst>
+          </p:cNvPr>
+          <p:cNvCxnSpPr>
+            <a:stCxn id="14" idx="3"/>
+            <a:endCxn id="12" idx="3"/>
+          </p:cNvCxnSpPr>
+          <p:nvPr/>
+        </p:nvCxnSpPr>
+        <p:spPr>
+          <a:xfrm flipV="1">
+            <a:off x="7086008" y="3829601"/>
+            <a:ext cx="106289" cy="1258904"/>
+          </a:xfrm>
+          <a:prstGeom prst="bentConnector3">
+            <a:avLst>
+              <a:gd name="adj1" fmla="val 315074"/>
+            </a:avLst>
+          </a:prstGeom>
+          <a:ln>
+            <a:solidFill>
+              <a:schemeClr val="tx1">
+                <a:lumMod val="75000"/>
+                <a:lumOff val="25000"/>
+              </a:schemeClr>
+            </a:solidFill>
+            <a:tailEnd type="triangle"/>
+          </a:ln>
+        </p:spPr>
+        <p:style>
+          <a:lnRef idx="2">
+            <a:schemeClr val="accent1"/>
+          </a:lnRef>
+          <a:fillRef idx="0">
+            <a:schemeClr val="accent1"/>
+          </a:fillRef>
+          <a:effectRef idx="1">
+            <a:schemeClr val="accent1"/>
+          </a:effectRef>
+          <a:fontRef idx="minor">
+            <a:schemeClr val="tx1"/>
+          </a:fontRef>
+        </p:style>
+      </p:cxnSp>
+      <p:cxnSp>
+        <p:nvCxnSpPr>
+          <p:cNvPr id="67" name="Connector: Elbow 66">
+            <a:extLst>
+              <a:ext uri="{FF2B5EF4-FFF2-40B4-BE49-F238E27FC236}">
+                <a16:creationId xmlns:a16="http://schemas.microsoft.com/office/drawing/2014/main" id="{2991F303-768A-834E-0CEF-DC3D0DE10D2A}"/>
+              </a:ext>
+            </a:extLst>
+          </p:cNvPr>
+          <p:cNvCxnSpPr>
+            <a:stCxn id="14" idx="1"/>
+            <a:endCxn id="18" idx="1"/>
+          </p:cNvCxnSpPr>
+          <p:nvPr/>
+        </p:nvCxnSpPr>
+        <p:spPr>
+          <a:xfrm rot="10800000">
+            <a:off x="4997179" y="4569855"/>
+            <a:ext cx="106290" cy="518651"/>
+          </a:xfrm>
+          <a:prstGeom prst="bentConnector3">
+            <a:avLst>
+              <a:gd name="adj1" fmla="val 315072"/>
+            </a:avLst>
+          </a:prstGeom>
+          <a:ln>
+            <a:solidFill>
+              <a:schemeClr val="tx1">
+                <a:lumMod val="75000"/>
+                <a:lumOff val="25000"/>
+              </a:schemeClr>
+            </a:solidFill>
+            <a:tailEnd type="triangle"/>
+          </a:ln>
+        </p:spPr>
+        <p:style>
+          <a:lnRef idx="2">
+            <a:schemeClr val="accent1"/>
+          </a:lnRef>
+          <a:fillRef idx="0">
+            <a:schemeClr val="accent1"/>
+          </a:fillRef>
+          <a:effectRef idx="1">
+            <a:schemeClr val="accent1"/>
+          </a:effectRef>
+          <a:fontRef idx="minor">
+            <a:schemeClr val="tx1"/>
+          </a:fontRef>
+        </p:style>
+      </p:cxnSp>
+    </p:spTree>
+    <p:extLst>
+      <p:ext uri="{BB962C8B-B14F-4D97-AF65-F5344CB8AC3E}">
+        <p14:creationId xmlns:p14="http://schemas.microsoft.com/office/powerpoint/2010/main" val="4023719810"/>
+      </p:ext>
+    </p:extLst>
+  </p:cSld>
+  <p:clrMapOvr>
+    <a:masterClrMapping/>
+  </p:clrMapOvr>
+</p:sld>
+</file>
+
 <file path=ppt/theme/theme1.xml><?xml version="1.0" encoding="utf-8"?>
 <a:theme xmlns:a="http://schemas.openxmlformats.org/drawingml/2006/main" name="Office Theme">
   <a:themeElements>

</xml_diff>

<commit_message>
added architecture and updated flow diagram
</commit_message>
<xml_diff>
--- a/diagrams/diagrams.pptx
+++ b/diagrams/diagrams.pptx
@@ -272,7 +272,7 @@
           <a:p>
             <a:fld id="{DA6D5642-3BC6-4258-B43A-21752B449250}" type="datetimeFigureOut">
               <a:rPr lang="en-US" smtClean="0"/>
-              <a:t>4/25/2025</a:t>
+              <a:t>4/26/2025</a:t>
             </a:fld>
             <a:endParaRPr lang="en-US"/>
           </a:p>
@@ -470,7 +470,7 @@
           <a:p>
             <a:fld id="{DA6D5642-3BC6-4258-B43A-21752B449250}" type="datetimeFigureOut">
               <a:rPr lang="en-US" smtClean="0"/>
-              <a:t>4/25/2025</a:t>
+              <a:t>4/26/2025</a:t>
             </a:fld>
             <a:endParaRPr lang="en-US"/>
           </a:p>
@@ -678,7 +678,7 @@
           <a:p>
             <a:fld id="{DA6D5642-3BC6-4258-B43A-21752B449250}" type="datetimeFigureOut">
               <a:rPr lang="en-US" smtClean="0"/>
-              <a:t>4/25/2025</a:t>
+              <a:t>4/26/2025</a:t>
             </a:fld>
             <a:endParaRPr lang="en-US"/>
           </a:p>
@@ -876,7 +876,7 @@
           <a:p>
             <a:fld id="{DA6D5642-3BC6-4258-B43A-21752B449250}" type="datetimeFigureOut">
               <a:rPr lang="en-US" smtClean="0"/>
-              <a:t>4/25/2025</a:t>
+              <a:t>4/26/2025</a:t>
             </a:fld>
             <a:endParaRPr lang="en-US"/>
           </a:p>
@@ -1151,7 +1151,7 @@
           <a:p>
             <a:fld id="{DA6D5642-3BC6-4258-B43A-21752B449250}" type="datetimeFigureOut">
               <a:rPr lang="en-US" smtClean="0"/>
-              <a:t>4/25/2025</a:t>
+              <a:t>4/26/2025</a:t>
             </a:fld>
             <a:endParaRPr lang="en-US"/>
           </a:p>
@@ -1416,7 +1416,7 @@
           <a:p>
             <a:fld id="{DA6D5642-3BC6-4258-B43A-21752B449250}" type="datetimeFigureOut">
               <a:rPr lang="en-US" smtClean="0"/>
-              <a:t>4/25/2025</a:t>
+              <a:t>4/26/2025</a:t>
             </a:fld>
             <a:endParaRPr lang="en-US"/>
           </a:p>
@@ -1828,7 +1828,7 @@
           <a:p>
             <a:fld id="{DA6D5642-3BC6-4258-B43A-21752B449250}" type="datetimeFigureOut">
               <a:rPr lang="en-US" smtClean="0"/>
-              <a:t>4/25/2025</a:t>
+              <a:t>4/26/2025</a:t>
             </a:fld>
             <a:endParaRPr lang="en-US"/>
           </a:p>
@@ -1969,7 +1969,7 @@
           <a:p>
             <a:fld id="{DA6D5642-3BC6-4258-B43A-21752B449250}" type="datetimeFigureOut">
               <a:rPr lang="en-US" smtClean="0"/>
-              <a:t>4/25/2025</a:t>
+              <a:t>4/26/2025</a:t>
             </a:fld>
             <a:endParaRPr lang="en-US"/>
           </a:p>
@@ -2082,7 +2082,7 @@
           <a:p>
             <a:fld id="{DA6D5642-3BC6-4258-B43A-21752B449250}" type="datetimeFigureOut">
               <a:rPr lang="en-US" smtClean="0"/>
-              <a:t>4/25/2025</a:t>
+              <a:t>4/26/2025</a:t>
             </a:fld>
             <a:endParaRPr lang="en-US"/>
           </a:p>
@@ -2393,7 +2393,7 @@
           <a:p>
             <a:fld id="{DA6D5642-3BC6-4258-B43A-21752B449250}" type="datetimeFigureOut">
               <a:rPr lang="en-US" smtClean="0"/>
-              <a:t>4/25/2025</a:t>
+              <a:t>4/26/2025</a:t>
             </a:fld>
             <a:endParaRPr lang="en-US"/>
           </a:p>
@@ -2681,7 +2681,7 @@
           <a:p>
             <a:fld id="{DA6D5642-3BC6-4258-B43A-21752B449250}" type="datetimeFigureOut">
               <a:rPr lang="en-US" smtClean="0"/>
-              <a:t>4/25/2025</a:t>
+              <a:t>4/26/2025</a:t>
             </a:fld>
             <a:endParaRPr lang="en-US"/>
           </a:p>
@@ -2922,7 +2922,7 @@
           <a:p>
             <a:fld id="{DA6D5642-3BC6-4258-B43A-21752B449250}" type="datetimeFigureOut">
               <a:rPr lang="en-US" smtClean="0"/>
-              <a:t>4/25/2025</a:t>
+              <a:t>4/26/2025</a:t>
             </a:fld>
             <a:endParaRPr lang="en-US"/>
           </a:p>
@@ -3428,7 +3428,7 @@
         </p:blipFill>
         <p:spPr>
           <a:xfrm>
-            <a:off x="2961699" y="1508786"/>
+            <a:off x="3066177" y="1508786"/>
             <a:ext cx="692935" cy="681230"/>
           </a:xfrm>
           <a:prstGeom prst="rect">
@@ -3464,7 +3464,7 @@
         </p:blipFill>
         <p:spPr>
           <a:xfrm>
-            <a:off x="2961699" y="2784394"/>
+            <a:off x="3075366" y="2784394"/>
             <a:ext cx="674557" cy="663162"/>
           </a:xfrm>
           <a:prstGeom prst="rect">
@@ -3486,7 +3486,7 @@
         </p:nvSpPr>
         <p:spPr>
           <a:xfrm>
-            <a:off x="2582983" y="2171704"/>
+            <a:off x="2618341" y="2171704"/>
             <a:ext cx="1588606" cy="461665"/>
           </a:xfrm>
           <a:prstGeom prst="rect">
@@ -3522,7 +3522,7 @@
         </p:nvSpPr>
         <p:spPr>
           <a:xfrm>
-            <a:off x="2499919" y="3429000"/>
+            <a:off x="2663090" y="3429000"/>
             <a:ext cx="1499109" cy="461665"/>
           </a:xfrm>
           <a:prstGeom prst="rect">
@@ -3539,7 +3539,7 @@
             <a:pPr algn="ctr"/>
             <a:r>
               <a:rPr lang="en-US" sz="1200" b="1" dirty="0"/>
-              <a:t>Patient Similarity Graph</a:t>
+              <a:t>Patient Similarity Pairings</a:t>
             </a:r>
           </a:p>
         </p:txBody>
@@ -3677,7 +3677,7 @@
         <p:spPr>
           <a:xfrm>
             <a:off x="5018849" y="3323668"/>
-            <a:ext cx="1210275" cy="461665"/>
+            <a:ext cx="1351295" cy="646331"/>
           </a:xfrm>
           <a:prstGeom prst="rect">
             <a:avLst/>
@@ -3693,7 +3693,7 @@
             <a:pPr algn="ctr"/>
             <a:r>
               <a:rPr lang="en-US" sz="1200" b="1" dirty="0"/>
-              <a:t>Graph Neural Network</a:t>
+              <a:t>Relational Graph Convolutional Network</a:t>
             </a:r>
           </a:p>
         </p:txBody>

</xml_diff>